<commit_message>
updated readme, PPT, and css
</commit_message>
<xml_diff>
--- a/Data-Estate Presentation.pptx
+++ b/Data-Estate Presentation.pptx
@@ -17,39 +17,35 @@
     <p:sldId id="262" r:id="rId11"/>
     <p:sldId id="263" r:id="rId12"/>
     <p:sldId id="264" r:id="rId13"/>
-    <p:sldId id="265" r:id="rId14"/>
-    <p:sldId id="266" r:id="rId15"/>
-    <p:sldId id="267" r:id="rId16"/>
-    <p:sldId id="268" r:id="rId17"/>
   </p:sldIdLst>
   <p:sldSz cy="5143500" cx="9144000"/>
   <p:notesSz cx="6858000" cy="9144000"/>
   <p:embeddedFontLst>
     <p:embeddedFont>
       <p:font typeface="Raleway"/>
+      <p:regular r:id="rId14"/>
+      <p:bold r:id="rId15"/>
+      <p:italic r:id="rId16"/>
+      <p:boldItalic r:id="rId17"/>
+    </p:embeddedFont>
+    <p:embeddedFont>
+      <p:font typeface="Raleway SemiBold"/>
       <p:regular r:id="rId18"/>
       <p:bold r:id="rId19"/>
       <p:italic r:id="rId20"/>
       <p:boldItalic r:id="rId21"/>
     </p:embeddedFont>
     <p:embeddedFont>
-      <p:font typeface="Raleway SemiBold"/>
-      <p:regular r:id="rId22"/>
-      <p:bold r:id="rId23"/>
-      <p:italic r:id="rId24"/>
-      <p:boldItalic r:id="rId25"/>
-    </p:embeddedFont>
-    <p:embeddedFont>
       <p:font typeface="Red Hat Display Black"/>
-      <p:bold r:id="rId26"/>
-      <p:boldItalic r:id="rId27"/>
+      <p:bold r:id="rId22"/>
+      <p:boldItalic r:id="rId23"/>
     </p:embeddedFont>
     <p:embeddedFont>
       <p:font typeface="Red Hat Display"/>
-      <p:regular r:id="rId28"/>
-      <p:bold r:id="rId29"/>
-      <p:italic r:id="rId30"/>
-      <p:boldItalic r:id="rId31"/>
+      <p:regular r:id="rId24"/>
+      <p:bold r:id="rId25"/>
+      <p:italic r:id="rId26"/>
+      <p:boldItalic r:id="rId27"/>
     </p:embeddedFont>
   </p:embeddedFontLst>
   <p:defaultTextStyle>
@@ -765,402 +761,6 @@
       <p:sp>
         <p:nvSpPr>
           <p:cNvPr id="97" name="Google Shape;97;g35f391192_00:notes"/>
-          <p:cNvSpPr txBox="1"/>
-          <p:nvPr>
-            <p:ph idx="1" type="body"/>
-          </p:nvPr>
-        </p:nvSpPr>
-        <p:spPr>
-          <a:xfrm>
-            <a:off x="685800" y="4343400"/>
-            <a:ext cx="5486400" cy="4114800"/>
-          </a:xfrm>
-          <a:prstGeom prst="rect">
-            <a:avLst/>
-          </a:prstGeom>
-        </p:spPr>
-        <p:txBody>
-          <a:bodyPr anchorCtr="0" anchor="t" bIns="91425" lIns="91425" spcFirstLastPara="1" rIns="91425" wrap="square" tIns="91425">
-            <a:noAutofit/>
-          </a:bodyPr>
-          <a:lstStyle/>
-          <a:p>
-            <a:pPr indent="0" lvl="0" marL="0" rtl="0" algn="l">
-              <a:spcBef>
-                <a:spcPts val="0"/>
-              </a:spcBef>
-              <a:spcAft>
-                <a:spcPts val="0"/>
-              </a:spcAft>
-              <a:buNone/>
-            </a:pPr>
-            <a:r>
-              <a:t/>
-            </a:r>
-            <a:endParaRPr/>
-          </a:p>
-        </p:txBody>
-      </p:sp>
-    </p:spTree>
-  </p:cSld>
-  <p:clrMapOvr>
-    <a:masterClrMapping/>
-  </p:clrMapOvr>
-</p:notes>
-</file>
-
-<file path=ppt/notesSlides/notesSlide10.xml><?xml version="1.0" encoding="utf-8"?>
-<p:notes xmlns:a="http://schemas.openxmlformats.org/drawingml/2006/main" xmlns:r="http://schemas.openxmlformats.org/officeDocument/2006/relationships" xmlns:mc="http://schemas.openxmlformats.org/markup-compatibility/2006" xmlns:mv="urn:schemas-microsoft-com:mac:vml" xmlns:p="http://schemas.openxmlformats.org/presentationml/2006/main" xmlns:c="http://schemas.openxmlformats.org/drawingml/2006/chart" xmlns:dgm="http://schemas.openxmlformats.org/drawingml/2006/diagram" xmlns:o="urn:schemas-microsoft-com:office:office" xmlns:v="urn:schemas-microsoft-com:vml" xmlns:pvml="urn:schemas-microsoft-com:office:powerpoint" xmlns:com="http://schemas.openxmlformats.org/drawingml/2006/compatibility" xmlns:p14="http://schemas.microsoft.com/office/powerpoint/2010/main" xmlns:p15="http://schemas.microsoft.com/office/powerpoint/2012/main" showMasterPhAnim="0" showMasterSp="0">
-  <p:cSld>
-    <p:spTree>
-      <p:nvGrpSpPr>
-        <p:cNvPr id="192" name="Shape 192"/>
-        <p:cNvGrpSpPr/>
-        <p:nvPr/>
-      </p:nvGrpSpPr>
-      <p:grpSpPr>
-        <a:xfrm>
-          <a:off x="0" y="0"/>
-          <a:ext cx="0" cy="0"/>
-          <a:chOff x="0" y="0"/>
-          <a:chExt cx="0" cy="0"/>
-        </a:xfrm>
-      </p:grpSpPr>
-      <p:sp>
-        <p:nvSpPr>
-          <p:cNvPr id="193" name="Google Shape;193;g82c5005ac4_2_22:notes"/>
-          <p:cNvSpPr/>
-          <p:nvPr>
-            <p:ph idx="2" type="sldImg"/>
-          </p:nvPr>
-        </p:nvSpPr>
-        <p:spPr>
-          <a:xfrm>
-            <a:off x="381175" y="685800"/>
-            <a:ext cx="6096300" cy="3429000"/>
-          </a:xfrm>
-          <a:custGeom>
-            <a:rect b="b" l="l" r="r" t="t"/>
-            <a:pathLst>
-              <a:path extrusionOk="0" h="120000" w="120000">
-                <a:moveTo>
-                  <a:pt x="0" y="0"/>
-                </a:moveTo>
-                <a:lnTo>
-                  <a:pt x="120000" y="0"/>
-                </a:lnTo>
-                <a:lnTo>
-                  <a:pt x="120000" y="120000"/>
-                </a:lnTo>
-                <a:lnTo>
-                  <a:pt x="0" y="120000"/>
-                </a:lnTo>
-                <a:close/>
-              </a:path>
-            </a:pathLst>
-          </a:custGeom>
-        </p:spPr>
-      </p:sp>
-      <p:sp>
-        <p:nvSpPr>
-          <p:cNvPr id="194" name="Google Shape;194;g82c5005ac4_2_22:notes"/>
-          <p:cNvSpPr txBox="1"/>
-          <p:nvPr>
-            <p:ph idx="1" type="body"/>
-          </p:nvPr>
-        </p:nvSpPr>
-        <p:spPr>
-          <a:xfrm>
-            <a:off x="685800" y="4343400"/>
-            <a:ext cx="5486400" cy="4114800"/>
-          </a:xfrm>
-          <a:prstGeom prst="rect">
-            <a:avLst/>
-          </a:prstGeom>
-        </p:spPr>
-        <p:txBody>
-          <a:bodyPr anchorCtr="0" anchor="t" bIns="91425" lIns="91425" spcFirstLastPara="1" rIns="91425" wrap="square" tIns="91425">
-            <a:noAutofit/>
-          </a:bodyPr>
-          <a:lstStyle/>
-          <a:p>
-            <a:pPr indent="0" lvl="0" marL="0" rtl="0" algn="l">
-              <a:spcBef>
-                <a:spcPts val="0"/>
-              </a:spcBef>
-              <a:spcAft>
-                <a:spcPts val="0"/>
-              </a:spcAft>
-              <a:buNone/>
-            </a:pPr>
-            <a:r>
-              <a:t/>
-            </a:r>
-            <a:endParaRPr/>
-          </a:p>
-        </p:txBody>
-      </p:sp>
-    </p:spTree>
-  </p:cSld>
-  <p:clrMapOvr>
-    <a:masterClrMapping/>
-  </p:clrMapOvr>
-</p:notes>
-</file>
-
-<file path=ppt/notesSlides/notesSlide11.xml><?xml version="1.0" encoding="utf-8"?>
-<p:notes xmlns:a="http://schemas.openxmlformats.org/drawingml/2006/main" xmlns:r="http://schemas.openxmlformats.org/officeDocument/2006/relationships" xmlns:mc="http://schemas.openxmlformats.org/markup-compatibility/2006" xmlns:mv="urn:schemas-microsoft-com:mac:vml" xmlns:p="http://schemas.openxmlformats.org/presentationml/2006/main" xmlns:c="http://schemas.openxmlformats.org/drawingml/2006/chart" xmlns:dgm="http://schemas.openxmlformats.org/drawingml/2006/diagram" xmlns:o="urn:schemas-microsoft-com:office:office" xmlns:v="urn:schemas-microsoft-com:vml" xmlns:pvml="urn:schemas-microsoft-com:office:powerpoint" xmlns:com="http://schemas.openxmlformats.org/drawingml/2006/compatibility" xmlns:p14="http://schemas.microsoft.com/office/powerpoint/2010/main" xmlns:p15="http://schemas.microsoft.com/office/powerpoint/2012/main" showMasterPhAnim="0" showMasterSp="0">
-  <p:cSld>
-    <p:spTree>
-      <p:nvGrpSpPr>
-        <p:cNvPr id="200" name="Shape 200"/>
-        <p:cNvGrpSpPr/>
-        <p:nvPr/>
-      </p:nvGrpSpPr>
-      <p:grpSpPr>
-        <a:xfrm>
-          <a:off x="0" y="0"/>
-          <a:ext cx="0" cy="0"/>
-          <a:chOff x="0" y="0"/>
-          <a:chExt cx="0" cy="0"/>
-        </a:xfrm>
-      </p:grpSpPr>
-      <p:sp>
-        <p:nvSpPr>
-          <p:cNvPr id="201" name="Google Shape;201;g82c5005ac4_2_29:notes"/>
-          <p:cNvSpPr/>
-          <p:nvPr>
-            <p:ph idx="2" type="sldImg"/>
-          </p:nvPr>
-        </p:nvSpPr>
-        <p:spPr>
-          <a:xfrm>
-            <a:off x="381175" y="685800"/>
-            <a:ext cx="6096300" cy="3429000"/>
-          </a:xfrm>
-          <a:custGeom>
-            <a:rect b="b" l="l" r="r" t="t"/>
-            <a:pathLst>
-              <a:path extrusionOk="0" h="120000" w="120000">
-                <a:moveTo>
-                  <a:pt x="0" y="0"/>
-                </a:moveTo>
-                <a:lnTo>
-                  <a:pt x="120000" y="0"/>
-                </a:lnTo>
-                <a:lnTo>
-                  <a:pt x="120000" y="120000"/>
-                </a:lnTo>
-                <a:lnTo>
-                  <a:pt x="0" y="120000"/>
-                </a:lnTo>
-                <a:close/>
-              </a:path>
-            </a:pathLst>
-          </a:custGeom>
-        </p:spPr>
-      </p:sp>
-      <p:sp>
-        <p:nvSpPr>
-          <p:cNvPr id="202" name="Google Shape;202;g82c5005ac4_2_29:notes"/>
-          <p:cNvSpPr txBox="1"/>
-          <p:nvPr>
-            <p:ph idx="1" type="body"/>
-          </p:nvPr>
-        </p:nvSpPr>
-        <p:spPr>
-          <a:xfrm>
-            <a:off x="685800" y="4343400"/>
-            <a:ext cx="5486400" cy="4114800"/>
-          </a:xfrm>
-          <a:prstGeom prst="rect">
-            <a:avLst/>
-          </a:prstGeom>
-        </p:spPr>
-        <p:txBody>
-          <a:bodyPr anchorCtr="0" anchor="t" bIns="91425" lIns="91425" spcFirstLastPara="1" rIns="91425" wrap="square" tIns="91425">
-            <a:noAutofit/>
-          </a:bodyPr>
-          <a:lstStyle/>
-          <a:p>
-            <a:pPr indent="0" lvl="0" marL="0" rtl="0" algn="l">
-              <a:spcBef>
-                <a:spcPts val="0"/>
-              </a:spcBef>
-              <a:spcAft>
-                <a:spcPts val="0"/>
-              </a:spcAft>
-              <a:buNone/>
-            </a:pPr>
-            <a:r>
-              <a:t/>
-            </a:r>
-            <a:endParaRPr/>
-          </a:p>
-        </p:txBody>
-      </p:sp>
-    </p:spTree>
-  </p:cSld>
-  <p:clrMapOvr>
-    <a:masterClrMapping/>
-  </p:clrMapOvr>
-</p:notes>
-</file>
-
-<file path=ppt/notesSlides/notesSlide12.xml><?xml version="1.0" encoding="utf-8"?>
-<p:notes xmlns:a="http://schemas.openxmlformats.org/drawingml/2006/main" xmlns:r="http://schemas.openxmlformats.org/officeDocument/2006/relationships" xmlns:mc="http://schemas.openxmlformats.org/markup-compatibility/2006" xmlns:mv="urn:schemas-microsoft-com:mac:vml" xmlns:p="http://schemas.openxmlformats.org/presentationml/2006/main" xmlns:c="http://schemas.openxmlformats.org/drawingml/2006/chart" xmlns:dgm="http://schemas.openxmlformats.org/drawingml/2006/diagram" xmlns:o="urn:schemas-microsoft-com:office:office" xmlns:v="urn:schemas-microsoft-com:vml" xmlns:pvml="urn:schemas-microsoft-com:office:powerpoint" xmlns:com="http://schemas.openxmlformats.org/drawingml/2006/compatibility" xmlns:p14="http://schemas.microsoft.com/office/powerpoint/2010/main" xmlns:p15="http://schemas.microsoft.com/office/powerpoint/2012/main" showMasterPhAnim="0" showMasterSp="0">
-  <p:cSld>
-    <p:spTree>
-      <p:nvGrpSpPr>
-        <p:cNvPr id="208" name="Shape 208"/>
-        <p:cNvGrpSpPr/>
-        <p:nvPr/>
-      </p:nvGrpSpPr>
-      <p:grpSpPr>
-        <a:xfrm>
-          <a:off x="0" y="0"/>
-          <a:ext cx="0" cy="0"/>
-          <a:chOff x="0" y="0"/>
-          <a:chExt cx="0" cy="0"/>
-        </a:xfrm>
-      </p:grpSpPr>
-      <p:sp>
-        <p:nvSpPr>
-          <p:cNvPr id="209" name="Google Shape;209;g35ed75ccf_028:notes"/>
-          <p:cNvSpPr/>
-          <p:nvPr>
-            <p:ph idx="2" type="sldImg"/>
-          </p:nvPr>
-        </p:nvSpPr>
-        <p:spPr>
-          <a:xfrm>
-            <a:off x="381175" y="685800"/>
-            <a:ext cx="6096300" cy="3429000"/>
-          </a:xfrm>
-          <a:custGeom>
-            <a:rect b="b" l="l" r="r" t="t"/>
-            <a:pathLst>
-              <a:path extrusionOk="0" h="120000" w="120000">
-                <a:moveTo>
-                  <a:pt x="0" y="0"/>
-                </a:moveTo>
-                <a:lnTo>
-                  <a:pt x="120000" y="0"/>
-                </a:lnTo>
-                <a:lnTo>
-                  <a:pt x="120000" y="120000"/>
-                </a:lnTo>
-                <a:lnTo>
-                  <a:pt x="0" y="120000"/>
-                </a:lnTo>
-                <a:close/>
-              </a:path>
-            </a:pathLst>
-          </a:custGeom>
-        </p:spPr>
-      </p:sp>
-      <p:sp>
-        <p:nvSpPr>
-          <p:cNvPr id="210" name="Google Shape;210;g35ed75ccf_028:notes"/>
-          <p:cNvSpPr txBox="1"/>
-          <p:nvPr>
-            <p:ph idx="1" type="body"/>
-          </p:nvPr>
-        </p:nvSpPr>
-        <p:spPr>
-          <a:xfrm>
-            <a:off x="685800" y="4343400"/>
-            <a:ext cx="5486400" cy="4114800"/>
-          </a:xfrm>
-          <a:prstGeom prst="rect">
-            <a:avLst/>
-          </a:prstGeom>
-        </p:spPr>
-        <p:txBody>
-          <a:bodyPr anchorCtr="0" anchor="t" bIns="91425" lIns="91425" spcFirstLastPara="1" rIns="91425" wrap="square" tIns="91425">
-            <a:noAutofit/>
-          </a:bodyPr>
-          <a:lstStyle/>
-          <a:p>
-            <a:pPr indent="0" lvl="0" marL="0" rtl="0" algn="l">
-              <a:spcBef>
-                <a:spcPts val="0"/>
-              </a:spcBef>
-              <a:spcAft>
-                <a:spcPts val="0"/>
-              </a:spcAft>
-              <a:buNone/>
-            </a:pPr>
-            <a:r>
-              <a:t/>
-            </a:r>
-            <a:endParaRPr/>
-          </a:p>
-        </p:txBody>
-      </p:sp>
-    </p:spTree>
-  </p:cSld>
-  <p:clrMapOvr>
-    <a:masterClrMapping/>
-  </p:clrMapOvr>
-</p:notes>
-</file>
-
-<file path=ppt/notesSlides/notesSlide13.xml><?xml version="1.0" encoding="utf-8"?>
-<p:notes xmlns:a="http://schemas.openxmlformats.org/drawingml/2006/main" xmlns:r="http://schemas.openxmlformats.org/officeDocument/2006/relationships" xmlns:mc="http://schemas.openxmlformats.org/markup-compatibility/2006" xmlns:mv="urn:schemas-microsoft-com:mac:vml" xmlns:p="http://schemas.openxmlformats.org/presentationml/2006/main" xmlns:c="http://schemas.openxmlformats.org/drawingml/2006/chart" xmlns:dgm="http://schemas.openxmlformats.org/drawingml/2006/diagram" xmlns:o="urn:schemas-microsoft-com:office:office" xmlns:v="urn:schemas-microsoft-com:vml" xmlns:pvml="urn:schemas-microsoft-com:office:powerpoint" xmlns:com="http://schemas.openxmlformats.org/drawingml/2006/compatibility" xmlns:p14="http://schemas.microsoft.com/office/powerpoint/2010/main" xmlns:p15="http://schemas.microsoft.com/office/powerpoint/2012/main" showMasterPhAnim="0" showMasterSp="0">
-  <p:cSld>
-    <p:spTree>
-      <p:nvGrpSpPr>
-        <p:cNvPr id="215" name="Shape 215"/>
-        <p:cNvGrpSpPr/>
-        <p:nvPr/>
-      </p:nvGrpSpPr>
-      <p:grpSpPr>
-        <a:xfrm>
-          <a:off x="0" y="0"/>
-          <a:ext cx="0" cy="0"/>
-          <a:chOff x="0" y="0"/>
-          <a:chExt cx="0" cy="0"/>
-        </a:xfrm>
-      </p:grpSpPr>
-      <p:sp>
-        <p:nvSpPr>
-          <p:cNvPr id="216" name="Google Shape;216;g35ed75ccf_0113:notes"/>
-          <p:cNvSpPr/>
-          <p:nvPr>
-            <p:ph idx="2" type="sldImg"/>
-          </p:nvPr>
-        </p:nvSpPr>
-        <p:spPr>
-          <a:xfrm>
-            <a:off x="381175" y="685800"/>
-            <a:ext cx="6096300" cy="3429000"/>
-          </a:xfrm>
-          <a:custGeom>
-            <a:rect b="b" l="l" r="r" t="t"/>
-            <a:pathLst>
-              <a:path extrusionOk="0" h="120000" w="120000">
-                <a:moveTo>
-                  <a:pt x="0" y="0"/>
-                </a:moveTo>
-                <a:lnTo>
-                  <a:pt x="120000" y="0"/>
-                </a:lnTo>
-                <a:lnTo>
-                  <a:pt x="120000" y="120000"/>
-                </a:lnTo>
-                <a:lnTo>
-                  <a:pt x="0" y="120000"/>
-                </a:lnTo>
-                <a:close/>
-              </a:path>
-            </a:pathLst>
-          </a:custGeom>
-        </p:spPr>
-      </p:sp>
-      <p:sp>
-        <p:nvSpPr>
-          <p:cNvPr id="217" name="Google Shape;217;g35ed75ccf_0113:notes"/>
           <p:cNvSpPr txBox="1"/>
           <p:nvPr>
             <p:ph idx="1" type="body"/>
@@ -9636,1175 +9236,6 @@
 </p:sld>
 </file>
 
-<file path=ppt/slides/slide10.xml><?xml version="1.0" encoding="utf-8"?>
-<p:sld xmlns:a="http://schemas.openxmlformats.org/drawingml/2006/main" xmlns:r="http://schemas.openxmlformats.org/officeDocument/2006/relationships" xmlns:mc="http://schemas.openxmlformats.org/markup-compatibility/2006" xmlns:mv="urn:schemas-microsoft-com:mac:vml" xmlns:p="http://schemas.openxmlformats.org/presentationml/2006/main" xmlns:c="http://schemas.openxmlformats.org/drawingml/2006/chart" xmlns:dgm="http://schemas.openxmlformats.org/drawingml/2006/diagram" xmlns:o="urn:schemas-microsoft-com:office:office" xmlns:v="urn:schemas-microsoft-com:vml" xmlns:pvml="urn:schemas-microsoft-com:office:powerpoint" xmlns:com="http://schemas.openxmlformats.org/drawingml/2006/compatibility" xmlns:p14="http://schemas.microsoft.com/office/powerpoint/2010/main" xmlns:p15="http://schemas.microsoft.com/office/powerpoint/2012/main">
-  <p:cSld>
-    <p:bg>
-      <p:bgPr>
-        <a:blipFill>
-          <a:blip r:embed="rId3">
-            <a:alphaModFix/>
-          </a:blip>
-          <a:stretch>
-            <a:fillRect/>
-          </a:stretch>
-        </a:blipFill>
-      </p:bgPr>
-    </p:bg>
-    <p:spTree>
-      <p:nvGrpSpPr>
-        <p:cNvPr id="195" name="Shape 195"/>
-        <p:cNvGrpSpPr/>
-        <p:nvPr/>
-      </p:nvGrpSpPr>
-      <p:grpSpPr>
-        <a:xfrm>
-          <a:off x="0" y="0"/>
-          <a:ext cx="0" cy="0"/>
-          <a:chOff x="0" y="0"/>
-          <a:chExt cx="0" cy="0"/>
-        </a:xfrm>
-      </p:grpSpPr>
-      <p:sp>
-        <p:nvSpPr>
-          <p:cNvPr id="196" name="Google Shape;196;p23"/>
-          <p:cNvSpPr txBox="1"/>
-          <p:nvPr>
-            <p:ph idx="4294967295" type="title"/>
-          </p:nvPr>
-        </p:nvSpPr>
-        <p:spPr>
-          <a:xfrm>
-            <a:off x="455675" y="0"/>
-            <a:ext cx="4118100" cy="908100"/>
-          </a:xfrm>
-          <a:prstGeom prst="rect">
-            <a:avLst/>
-          </a:prstGeom>
-        </p:spPr>
-        <p:txBody>
-          <a:bodyPr anchorCtr="0" anchor="ctr" bIns="0" lIns="0" spcFirstLastPara="1" rIns="0" wrap="square" tIns="0">
-            <a:noAutofit/>
-          </a:bodyPr>
-          <a:lstStyle/>
-          <a:p>
-            <a:pPr indent="0" lvl="0" marL="0" rtl="0" algn="l">
-              <a:spcBef>
-                <a:spcPts val="0"/>
-              </a:spcBef>
-              <a:spcAft>
-                <a:spcPts val="0"/>
-              </a:spcAft>
-              <a:buNone/>
-            </a:pPr>
-            <a:r>
-              <a:rPr lang="en" sz="1800"/>
-              <a:t>Application </a:t>
-            </a:r>
-            <a:r>
-              <a:rPr lang="en" sz="1800">
-                <a:solidFill>
-                  <a:schemeClr val="accent1"/>
-                </a:solidFill>
-              </a:rPr>
-              <a:t>Web Pages</a:t>
-            </a:r>
-            <a:endParaRPr sz="1800"/>
-          </a:p>
-        </p:txBody>
-      </p:sp>
-      <p:sp>
-        <p:nvSpPr>
-          <p:cNvPr id="197" name="Google Shape;197;p23"/>
-          <p:cNvSpPr txBox="1"/>
-          <p:nvPr>
-            <p:ph idx="12" type="sldNum"/>
-          </p:nvPr>
-        </p:nvSpPr>
-        <p:spPr>
-          <a:xfrm>
-            <a:off x="8760475" y="4759953"/>
-            <a:ext cx="383400" cy="383400"/>
-          </a:xfrm>
-          <a:prstGeom prst="rect">
-            <a:avLst/>
-          </a:prstGeom>
-        </p:spPr>
-        <p:txBody>
-          <a:bodyPr anchorCtr="0" anchor="ctr" bIns="0" lIns="0" spcFirstLastPara="1" rIns="0" wrap="square" tIns="0">
-            <a:noAutofit/>
-          </a:bodyPr>
-          <a:lstStyle/>
-          <a:p>
-            <a:pPr indent="0" lvl="0" marL="0" rtl="0" algn="ctr">
-              <a:spcBef>
-                <a:spcPts val="0"/>
-              </a:spcBef>
-              <a:spcAft>
-                <a:spcPts val="0"/>
-              </a:spcAft>
-              <a:buNone/>
-            </a:pPr>
-            <a:fld id="{00000000-1234-1234-1234-123412341234}" type="slidenum">
-              <a:rPr lang="en"/>
-              <a:t>‹#›</a:t>
-            </a:fld>
-            <a:endParaRPr/>
-          </a:p>
-        </p:txBody>
-      </p:sp>
-      <p:sp>
-        <p:nvSpPr>
-          <p:cNvPr id="198" name="Google Shape;198;p23"/>
-          <p:cNvSpPr/>
-          <p:nvPr/>
-        </p:nvSpPr>
-        <p:spPr>
-          <a:xfrm>
-            <a:off x="2505250" y="1071550"/>
-            <a:ext cx="4118100" cy="2091300"/>
-          </a:xfrm>
-          <a:prstGeom prst="roundRect">
-            <a:avLst>
-              <a:gd fmla="val 16667" name="adj"/>
-            </a:avLst>
-          </a:prstGeom>
-          <a:solidFill>
-            <a:srgbClr val="D0E2E3">
-              <a:alpha val="45250"/>
-            </a:srgbClr>
-          </a:solidFill>
-          <a:ln cap="flat" cmpd="sng" w="9525">
-            <a:solidFill>
-              <a:schemeClr val="dk2"/>
-            </a:solidFill>
-            <a:prstDash val="solid"/>
-            <a:round/>
-            <a:headEnd len="sm" w="sm" type="none"/>
-            <a:tailEnd len="sm" w="sm" type="none"/>
-          </a:ln>
-        </p:spPr>
-        <p:txBody>
-          <a:bodyPr anchorCtr="0" anchor="ctr" bIns="91425" lIns="91425" spcFirstLastPara="1" rIns="91425" wrap="square" tIns="91425">
-            <a:noAutofit/>
-          </a:bodyPr>
-          <a:lstStyle/>
-          <a:p>
-            <a:pPr indent="0" lvl="0" marL="0" rtl="0" algn="l">
-              <a:spcBef>
-                <a:spcPts val="0"/>
-              </a:spcBef>
-              <a:spcAft>
-                <a:spcPts val="0"/>
-              </a:spcAft>
-              <a:buNone/>
-            </a:pPr>
-            <a:r>
-              <a:t/>
-            </a:r>
-            <a:endParaRPr/>
-          </a:p>
-        </p:txBody>
-      </p:sp>
-      <p:sp>
-        <p:nvSpPr>
-          <p:cNvPr id="199" name="Google Shape;199;p23"/>
-          <p:cNvSpPr txBox="1"/>
-          <p:nvPr>
-            <p:ph idx="4294967295" type="ctrTitle"/>
-          </p:nvPr>
-        </p:nvSpPr>
-        <p:spPr>
-          <a:xfrm>
-            <a:off x="2679375" y="1160250"/>
-            <a:ext cx="3683400" cy="1801500"/>
-          </a:xfrm>
-          <a:prstGeom prst="rect">
-            <a:avLst/>
-          </a:prstGeom>
-        </p:spPr>
-        <p:txBody>
-          <a:bodyPr anchorCtr="0" anchor="ctr" bIns="0" lIns="0" spcFirstLastPara="1" rIns="0" wrap="square" tIns="0">
-            <a:noAutofit/>
-          </a:bodyPr>
-          <a:lstStyle/>
-          <a:p>
-            <a:pPr indent="0" lvl="0" marL="0" rtl="0" algn="ctr">
-              <a:lnSpc>
-                <a:spcPct val="80000"/>
-              </a:lnSpc>
-              <a:spcBef>
-                <a:spcPts val="0"/>
-              </a:spcBef>
-              <a:spcAft>
-                <a:spcPts val="0"/>
-              </a:spcAft>
-              <a:buNone/>
-            </a:pPr>
-            <a:r>
-              <a:rPr lang="en" sz="4800">
-                <a:solidFill>
-                  <a:schemeClr val="accent1"/>
-                </a:solidFill>
-              </a:rPr>
-              <a:t>Visuals Page</a:t>
-            </a:r>
-            <a:endParaRPr sz="4800">
-              <a:solidFill>
-                <a:schemeClr val="accent1"/>
-              </a:solidFill>
-            </a:endParaRPr>
-          </a:p>
-        </p:txBody>
-      </p:sp>
-    </p:spTree>
-  </p:cSld>
-  <p:clrMapOvr>
-    <a:masterClrMapping/>
-  </p:clrMapOvr>
-</p:sld>
-</file>
-
-<file path=ppt/slides/slide11.xml><?xml version="1.0" encoding="utf-8"?>
-<p:sld xmlns:a="http://schemas.openxmlformats.org/drawingml/2006/main" xmlns:r="http://schemas.openxmlformats.org/officeDocument/2006/relationships" xmlns:mc="http://schemas.openxmlformats.org/markup-compatibility/2006" xmlns:mv="urn:schemas-microsoft-com:mac:vml" xmlns:p="http://schemas.openxmlformats.org/presentationml/2006/main" xmlns:c="http://schemas.openxmlformats.org/drawingml/2006/chart" xmlns:dgm="http://schemas.openxmlformats.org/drawingml/2006/diagram" xmlns:o="urn:schemas-microsoft-com:office:office" xmlns:v="urn:schemas-microsoft-com:vml" xmlns:pvml="urn:schemas-microsoft-com:office:powerpoint" xmlns:com="http://schemas.openxmlformats.org/drawingml/2006/compatibility" xmlns:p14="http://schemas.microsoft.com/office/powerpoint/2010/main" xmlns:p15="http://schemas.microsoft.com/office/powerpoint/2012/main">
-  <p:cSld>
-    <p:bg>
-      <p:bgPr>
-        <a:blipFill>
-          <a:blip r:embed="rId3">
-            <a:alphaModFix/>
-          </a:blip>
-          <a:stretch>
-            <a:fillRect/>
-          </a:stretch>
-        </a:blipFill>
-      </p:bgPr>
-    </p:bg>
-    <p:spTree>
-      <p:nvGrpSpPr>
-        <p:cNvPr id="203" name="Shape 203"/>
-        <p:cNvGrpSpPr/>
-        <p:nvPr/>
-      </p:nvGrpSpPr>
-      <p:grpSpPr>
-        <a:xfrm>
-          <a:off x="0" y="0"/>
-          <a:ext cx="0" cy="0"/>
-          <a:chOff x="0" y="0"/>
-          <a:chExt cx="0" cy="0"/>
-        </a:xfrm>
-      </p:grpSpPr>
-      <p:sp>
-        <p:nvSpPr>
-          <p:cNvPr id="204" name="Google Shape;204;p24"/>
-          <p:cNvSpPr txBox="1"/>
-          <p:nvPr>
-            <p:ph idx="4294967295" type="title"/>
-          </p:nvPr>
-        </p:nvSpPr>
-        <p:spPr>
-          <a:xfrm>
-            <a:off x="455675" y="0"/>
-            <a:ext cx="4118100" cy="908100"/>
-          </a:xfrm>
-          <a:prstGeom prst="rect">
-            <a:avLst/>
-          </a:prstGeom>
-        </p:spPr>
-        <p:txBody>
-          <a:bodyPr anchorCtr="0" anchor="ctr" bIns="0" lIns="0" spcFirstLastPara="1" rIns="0" wrap="square" tIns="0">
-            <a:noAutofit/>
-          </a:bodyPr>
-          <a:lstStyle/>
-          <a:p>
-            <a:pPr indent="0" lvl="0" marL="0" rtl="0" algn="l">
-              <a:spcBef>
-                <a:spcPts val="0"/>
-              </a:spcBef>
-              <a:spcAft>
-                <a:spcPts val="0"/>
-              </a:spcAft>
-              <a:buNone/>
-            </a:pPr>
-            <a:r>
-              <a:rPr lang="en" sz="1800"/>
-              <a:t>Application </a:t>
-            </a:r>
-            <a:r>
-              <a:rPr lang="en" sz="1800">
-                <a:solidFill>
-                  <a:schemeClr val="accent1"/>
-                </a:solidFill>
-              </a:rPr>
-              <a:t>Web Pages</a:t>
-            </a:r>
-            <a:endParaRPr sz="1800"/>
-          </a:p>
-        </p:txBody>
-      </p:sp>
-      <p:sp>
-        <p:nvSpPr>
-          <p:cNvPr id="205" name="Google Shape;205;p24"/>
-          <p:cNvSpPr txBox="1"/>
-          <p:nvPr>
-            <p:ph idx="12" type="sldNum"/>
-          </p:nvPr>
-        </p:nvSpPr>
-        <p:spPr>
-          <a:xfrm>
-            <a:off x="8760475" y="4759953"/>
-            <a:ext cx="383400" cy="383400"/>
-          </a:xfrm>
-          <a:prstGeom prst="rect">
-            <a:avLst/>
-          </a:prstGeom>
-        </p:spPr>
-        <p:txBody>
-          <a:bodyPr anchorCtr="0" anchor="ctr" bIns="0" lIns="0" spcFirstLastPara="1" rIns="0" wrap="square" tIns="0">
-            <a:noAutofit/>
-          </a:bodyPr>
-          <a:lstStyle/>
-          <a:p>
-            <a:pPr indent="0" lvl="0" marL="0" rtl="0" algn="ctr">
-              <a:spcBef>
-                <a:spcPts val="0"/>
-              </a:spcBef>
-              <a:spcAft>
-                <a:spcPts val="0"/>
-              </a:spcAft>
-              <a:buNone/>
-            </a:pPr>
-            <a:fld id="{00000000-1234-1234-1234-123412341234}" type="slidenum">
-              <a:rPr lang="en"/>
-              <a:t>‹#›</a:t>
-            </a:fld>
-            <a:endParaRPr/>
-          </a:p>
-        </p:txBody>
-      </p:sp>
-      <p:sp>
-        <p:nvSpPr>
-          <p:cNvPr id="206" name="Google Shape;206;p24"/>
-          <p:cNvSpPr/>
-          <p:nvPr/>
-        </p:nvSpPr>
-        <p:spPr>
-          <a:xfrm>
-            <a:off x="2505250" y="1071550"/>
-            <a:ext cx="4118100" cy="2091300"/>
-          </a:xfrm>
-          <a:prstGeom prst="roundRect">
-            <a:avLst>
-              <a:gd fmla="val 16667" name="adj"/>
-            </a:avLst>
-          </a:prstGeom>
-          <a:solidFill>
-            <a:srgbClr val="D0E2E3">
-              <a:alpha val="45250"/>
-            </a:srgbClr>
-          </a:solidFill>
-          <a:ln cap="flat" cmpd="sng" w="9525">
-            <a:solidFill>
-              <a:schemeClr val="dk2"/>
-            </a:solidFill>
-            <a:prstDash val="solid"/>
-            <a:round/>
-            <a:headEnd len="sm" w="sm" type="none"/>
-            <a:tailEnd len="sm" w="sm" type="none"/>
-          </a:ln>
-        </p:spPr>
-        <p:txBody>
-          <a:bodyPr anchorCtr="0" anchor="ctr" bIns="91425" lIns="91425" spcFirstLastPara="1" rIns="91425" wrap="square" tIns="91425">
-            <a:noAutofit/>
-          </a:bodyPr>
-          <a:lstStyle/>
-          <a:p>
-            <a:pPr indent="0" lvl="0" marL="0" rtl="0" algn="l">
-              <a:spcBef>
-                <a:spcPts val="0"/>
-              </a:spcBef>
-              <a:spcAft>
-                <a:spcPts val="0"/>
-              </a:spcAft>
-              <a:buNone/>
-            </a:pPr>
-            <a:r>
-              <a:t/>
-            </a:r>
-            <a:endParaRPr/>
-          </a:p>
-        </p:txBody>
-      </p:sp>
-      <p:sp>
-        <p:nvSpPr>
-          <p:cNvPr id="207" name="Google Shape;207;p24"/>
-          <p:cNvSpPr txBox="1"/>
-          <p:nvPr>
-            <p:ph idx="4294967295" type="ctrTitle"/>
-          </p:nvPr>
-        </p:nvSpPr>
-        <p:spPr>
-          <a:xfrm>
-            <a:off x="2679375" y="1160250"/>
-            <a:ext cx="3683400" cy="1801500"/>
-          </a:xfrm>
-          <a:prstGeom prst="rect">
-            <a:avLst/>
-          </a:prstGeom>
-        </p:spPr>
-        <p:txBody>
-          <a:bodyPr anchorCtr="0" anchor="ctr" bIns="0" lIns="0" spcFirstLastPara="1" rIns="0" wrap="square" tIns="0">
-            <a:noAutofit/>
-          </a:bodyPr>
-          <a:lstStyle/>
-          <a:p>
-            <a:pPr indent="0" lvl="0" marL="0" rtl="0" algn="ctr">
-              <a:lnSpc>
-                <a:spcPct val="80000"/>
-              </a:lnSpc>
-              <a:spcBef>
-                <a:spcPts val="0"/>
-              </a:spcBef>
-              <a:spcAft>
-                <a:spcPts val="0"/>
-              </a:spcAft>
-              <a:buNone/>
-            </a:pPr>
-            <a:r>
-              <a:rPr lang="en" sz="4800">
-                <a:solidFill>
-                  <a:schemeClr val="accent1"/>
-                </a:solidFill>
-              </a:rPr>
-              <a:t>Predictions Page</a:t>
-            </a:r>
-            <a:endParaRPr sz="4800">
-              <a:solidFill>
-                <a:schemeClr val="accent1"/>
-              </a:solidFill>
-            </a:endParaRPr>
-          </a:p>
-        </p:txBody>
-      </p:sp>
-    </p:spTree>
-  </p:cSld>
-  <p:clrMapOvr>
-    <a:masterClrMapping/>
-  </p:clrMapOvr>
-</p:sld>
-</file>
-
-<file path=ppt/slides/slide12.xml><?xml version="1.0" encoding="utf-8"?>
-<p:sld xmlns:a="http://schemas.openxmlformats.org/drawingml/2006/main" xmlns:r="http://schemas.openxmlformats.org/officeDocument/2006/relationships" xmlns:mc="http://schemas.openxmlformats.org/markup-compatibility/2006" xmlns:mv="urn:schemas-microsoft-com:mac:vml" xmlns:p="http://schemas.openxmlformats.org/presentationml/2006/main" xmlns:c="http://schemas.openxmlformats.org/drawingml/2006/chart" xmlns:dgm="http://schemas.openxmlformats.org/drawingml/2006/diagram" xmlns:o="urn:schemas-microsoft-com:office:office" xmlns:v="urn:schemas-microsoft-com:vml" xmlns:pvml="urn:schemas-microsoft-com:office:powerpoint" xmlns:com="http://schemas.openxmlformats.org/drawingml/2006/compatibility" xmlns:p14="http://schemas.microsoft.com/office/powerpoint/2010/main" xmlns:p15="http://schemas.microsoft.com/office/powerpoint/2012/main">
-  <p:cSld>
-    <p:bg>
-      <p:bgPr>
-        <a:solidFill>
-          <a:schemeClr val="accent1"/>
-        </a:solidFill>
-      </p:bgPr>
-    </p:bg>
-    <p:spTree>
-      <p:nvGrpSpPr>
-        <p:cNvPr id="211" name="Shape 211"/>
-        <p:cNvGrpSpPr/>
-        <p:nvPr/>
-      </p:nvGrpSpPr>
-      <p:grpSpPr>
-        <a:xfrm>
-          <a:off x="0" y="0"/>
-          <a:ext cx="0" cy="0"/>
-          <a:chOff x="0" y="0"/>
-          <a:chExt cx="0" cy="0"/>
-        </a:xfrm>
-      </p:grpSpPr>
-      <p:sp>
-        <p:nvSpPr>
-          <p:cNvPr id="212" name="Google Shape;212;p25"/>
-          <p:cNvSpPr txBox="1"/>
-          <p:nvPr>
-            <p:ph idx="4294967295" type="ctrTitle"/>
-          </p:nvPr>
-        </p:nvSpPr>
-        <p:spPr>
-          <a:xfrm>
-            <a:off x="685800" y="1583342"/>
-            <a:ext cx="7772400" cy="1159800"/>
-          </a:xfrm>
-          <a:prstGeom prst="rect">
-            <a:avLst/>
-          </a:prstGeom>
-        </p:spPr>
-        <p:txBody>
-          <a:bodyPr anchorCtr="0" anchor="ctr" bIns="0" lIns="0" spcFirstLastPara="1" rIns="0" wrap="square" tIns="0">
-            <a:noAutofit/>
-          </a:bodyPr>
-          <a:lstStyle/>
-          <a:p>
-            <a:pPr indent="0" lvl="0" marL="0" rtl="0" algn="ctr">
-              <a:spcBef>
-                <a:spcPts val="0"/>
-              </a:spcBef>
-              <a:spcAft>
-                <a:spcPts val="0"/>
-              </a:spcAft>
-              <a:buNone/>
-            </a:pPr>
-            <a:r>
-              <a:rPr lang="en" sz="9600"/>
-              <a:t>25,564</a:t>
-            </a:r>
-            <a:endParaRPr sz="9600"/>
-          </a:p>
-        </p:txBody>
-      </p:sp>
-      <p:sp>
-        <p:nvSpPr>
-          <p:cNvPr id="213" name="Google Shape;213;p25"/>
-          <p:cNvSpPr txBox="1"/>
-          <p:nvPr>
-            <p:ph idx="4294967295" type="subTitle"/>
-          </p:nvPr>
-        </p:nvSpPr>
-        <p:spPr>
-          <a:xfrm>
-            <a:off x="685800" y="2840053"/>
-            <a:ext cx="7772400" cy="784800"/>
-          </a:xfrm>
-          <a:prstGeom prst="rect">
-            <a:avLst/>
-          </a:prstGeom>
-        </p:spPr>
-        <p:txBody>
-          <a:bodyPr anchorCtr="0" anchor="t" bIns="0" lIns="0" spcFirstLastPara="1" rIns="0" wrap="square" tIns="0">
-            <a:noAutofit/>
-          </a:bodyPr>
-          <a:lstStyle/>
-          <a:p>
-            <a:pPr indent="0" lvl="0" marL="0" rtl="0" algn="ctr">
-              <a:spcBef>
-                <a:spcPts val="600"/>
-              </a:spcBef>
-              <a:spcAft>
-                <a:spcPts val="0"/>
-              </a:spcAft>
-              <a:buNone/>
-            </a:pPr>
-            <a:r>
-              <a:rPr lang="en"/>
-              <a:t>For a total top ten zip codes in the Houston area</a:t>
-            </a:r>
-            <a:endParaRPr/>
-          </a:p>
-        </p:txBody>
-      </p:sp>
-      <p:sp>
-        <p:nvSpPr>
-          <p:cNvPr id="214" name="Google Shape;214;p25"/>
-          <p:cNvSpPr txBox="1"/>
-          <p:nvPr>
-            <p:ph idx="12" type="sldNum"/>
-          </p:nvPr>
-        </p:nvSpPr>
-        <p:spPr>
-          <a:xfrm>
-            <a:off x="8760475" y="4759953"/>
-            <a:ext cx="383400" cy="383400"/>
-          </a:xfrm>
-          <a:prstGeom prst="rect">
-            <a:avLst/>
-          </a:prstGeom>
-        </p:spPr>
-        <p:txBody>
-          <a:bodyPr anchorCtr="0" anchor="ctr" bIns="0" lIns="0" spcFirstLastPara="1" rIns="0" wrap="square" tIns="0">
-            <a:noAutofit/>
-          </a:bodyPr>
-          <a:lstStyle/>
-          <a:p>
-            <a:pPr indent="0" lvl="0" marL="0" rtl="0" algn="ctr">
-              <a:spcBef>
-                <a:spcPts val="0"/>
-              </a:spcBef>
-              <a:spcAft>
-                <a:spcPts val="0"/>
-              </a:spcAft>
-              <a:buNone/>
-            </a:pPr>
-            <a:fld id="{00000000-1234-1234-1234-123412341234}" type="slidenum">
-              <a:rPr lang="en"/>
-              <a:t>‹#›</a:t>
-            </a:fld>
-            <a:endParaRPr/>
-          </a:p>
-        </p:txBody>
-      </p:sp>
-    </p:spTree>
-  </p:cSld>
-  <p:clrMapOvr>
-    <a:masterClrMapping/>
-  </p:clrMapOvr>
-</p:sld>
-</file>
-
-<file path=ppt/slides/slide13.xml><?xml version="1.0" encoding="utf-8"?>
-<p:sld xmlns:a="http://schemas.openxmlformats.org/drawingml/2006/main" xmlns:r="http://schemas.openxmlformats.org/officeDocument/2006/relationships" xmlns:mc="http://schemas.openxmlformats.org/markup-compatibility/2006" xmlns:mv="urn:schemas-microsoft-com:mac:vml" xmlns:p="http://schemas.openxmlformats.org/presentationml/2006/main" xmlns:c="http://schemas.openxmlformats.org/drawingml/2006/chart" xmlns:dgm="http://schemas.openxmlformats.org/drawingml/2006/diagram" xmlns:o="urn:schemas-microsoft-com:office:office" xmlns:v="urn:schemas-microsoft-com:vml" xmlns:pvml="urn:schemas-microsoft-com:office:powerpoint" xmlns:com="http://schemas.openxmlformats.org/drawingml/2006/compatibility" xmlns:p14="http://schemas.microsoft.com/office/powerpoint/2010/main" xmlns:p15="http://schemas.microsoft.com/office/powerpoint/2012/main">
-  <p:cSld>
-    <p:bg>
-      <p:bgPr>
-        <a:solidFill>
-          <a:schemeClr val="lt2"/>
-        </a:solidFill>
-      </p:bgPr>
-    </p:bg>
-    <p:spTree>
-      <p:nvGrpSpPr>
-        <p:cNvPr id="218" name="Shape 218"/>
-        <p:cNvGrpSpPr/>
-        <p:nvPr/>
-      </p:nvGrpSpPr>
-      <p:grpSpPr>
-        <a:xfrm>
-          <a:off x="0" y="0"/>
-          <a:ext cx="0" cy="0"/>
-          <a:chOff x="0" y="0"/>
-          <a:chExt cx="0" cy="0"/>
-        </a:xfrm>
-      </p:grpSpPr>
-      <p:sp>
-        <p:nvSpPr>
-          <p:cNvPr id="219" name="Google Shape;219;p26"/>
-          <p:cNvSpPr/>
-          <p:nvPr/>
-        </p:nvSpPr>
-        <p:spPr>
-          <a:xfrm>
-            <a:off x="4450075" y="1305138"/>
-            <a:ext cx="3532500" cy="2249400"/>
-          </a:xfrm>
-          <a:prstGeom prst="rect">
-            <a:avLst/>
-          </a:prstGeom>
-          <a:noFill/>
-          <a:ln>
-            <a:noFill/>
-          </a:ln>
-        </p:spPr>
-        <p:txBody>
-          <a:bodyPr anchorCtr="0" anchor="ctr" bIns="91425" lIns="91425" spcFirstLastPara="1" rIns="91425" wrap="square" tIns="91425">
-            <a:noAutofit/>
-          </a:bodyPr>
-          <a:lstStyle/>
-          <a:p>
-            <a:pPr indent="0" lvl="0" marL="0" rtl="0" algn="ctr">
-              <a:spcBef>
-                <a:spcPts val="0"/>
-              </a:spcBef>
-              <a:spcAft>
-                <a:spcPts val="0"/>
-              </a:spcAft>
-              <a:buNone/>
-            </a:pPr>
-            <a:r>
-              <a:t/>
-            </a:r>
-            <a:endParaRPr sz="1000">
-              <a:solidFill>
-                <a:schemeClr val="dk2"/>
-              </a:solidFill>
-              <a:latin typeface="Raleway"/>
-              <a:ea typeface="Raleway"/>
-              <a:cs typeface="Raleway"/>
-              <a:sym typeface="Raleway"/>
-            </a:endParaRPr>
-          </a:p>
-        </p:txBody>
-      </p:sp>
-      <p:sp>
-        <p:nvSpPr>
-          <p:cNvPr id="220" name="Google Shape;220;p26"/>
-          <p:cNvSpPr txBox="1"/>
-          <p:nvPr>
-            <p:ph idx="12" type="sldNum"/>
-          </p:nvPr>
-        </p:nvSpPr>
-        <p:spPr>
-          <a:xfrm>
-            <a:off x="8760475" y="4759953"/>
-            <a:ext cx="383400" cy="383400"/>
-          </a:xfrm>
-          <a:prstGeom prst="rect">
-            <a:avLst/>
-          </a:prstGeom>
-        </p:spPr>
-        <p:txBody>
-          <a:bodyPr anchorCtr="0" anchor="ctr" bIns="0" lIns="0" spcFirstLastPara="1" rIns="0" wrap="square" tIns="0">
-            <a:noAutofit/>
-          </a:bodyPr>
-          <a:lstStyle/>
-          <a:p>
-            <a:pPr indent="0" lvl="0" marL="0" rtl="0" algn="ctr">
-              <a:spcBef>
-                <a:spcPts val="0"/>
-              </a:spcBef>
-              <a:spcAft>
-                <a:spcPts val="0"/>
-              </a:spcAft>
-              <a:buNone/>
-            </a:pPr>
-            <a:fld id="{00000000-1234-1234-1234-123412341234}" type="slidenum">
-              <a:rPr lang="en"/>
-              <a:t>‹#›</a:t>
-            </a:fld>
-            <a:endParaRPr/>
-          </a:p>
-        </p:txBody>
-      </p:sp>
-      <p:grpSp>
-        <p:nvGrpSpPr>
-          <p:cNvPr id="221" name="Google Shape;221;p26"/>
-          <p:cNvGrpSpPr/>
-          <p:nvPr/>
-        </p:nvGrpSpPr>
-        <p:grpSpPr>
-          <a:xfrm>
-            <a:off x="3945224" y="1164929"/>
-            <a:ext cx="4542205" cy="2661224"/>
-            <a:chOff x="1177450" y="241631"/>
-            <a:chExt cx="6173152" cy="3616776"/>
-          </a:xfrm>
-        </p:grpSpPr>
-        <p:sp>
-          <p:nvSpPr>
-            <p:cNvPr id="222" name="Google Shape;222;p26"/>
-            <p:cNvSpPr/>
-            <p:nvPr/>
-          </p:nvSpPr>
-          <p:spPr>
-            <a:xfrm>
-              <a:off x="1682275" y="241631"/>
-              <a:ext cx="5161606" cy="3454973"/>
-            </a:xfrm>
-            <a:custGeom>
-              <a:rect b="b" l="l" r="r" t="t"/>
-              <a:pathLst>
-                <a:path extrusionOk="0" h="3454973" w="5161606">
-                  <a:moveTo>
-                    <a:pt x="4992053" y="0"/>
-                  </a:moveTo>
-                  <a:lnTo>
-                    <a:pt x="170498" y="0"/>
-                  </a:lnTo>
-                  <a:cubicBezTo>
-                    <a:pt x="76200" y="0"/>
-                    <a:pt x="0" y="76143"/>
-                    <a:pt x="0" y="170369"/>
-                  </a:cubicBezTo>
-                  <a:lnTo>
-                    <a:pt x="0" y="3396915"/>
-                  </a:lnTo>
-                  <a:cubicBezTo>
-                    <a:pt x="0" y="3429275"/>
-                    <a:pt x="26670" y="3454973"/>
-                    <a:pt x="58102" y="3454973"/>
-                  </a:cubicBezTo>
-                  <a:lnTo>
-                    <a:pt x="5103495" y="3454973"/>
-                  </a:lnTo>
-                  <a:cubicBezTo>
-                    <a:pt x="5135880" y="3454973"/>
-                    <a:pt x="5161598" y="3428324"/>
-                    <a:pt x="5161598" y="3396915"/>
-                  </a:cubicBezTo>
-                  <a:lnTo>
-                    <a:pt x="5161598" y="170369"/>
-                  </a:lnTo>
-                  <a:cubicBezTo>
-                    <a:pt x="5162550" y="76143"/>
-                    <a:pt x="5086350" y="0"/>
-                    <a:pt x="4992053" y="0"/>
-                  </a:cubicBezTo>
-                  <a:close/>
-                  <a:moveTo>
-                    <a:pt x="4981575" y="3245581"/>
-                  </a:moveTo>
-                  <a:lnTo>
-                    <a:pt x="190500" y="3245581"/>
-                  </a:lnTo>
-                  <a:lnTo>
-                    <a:pt x="190500" y="199874"/>
-                  </a:lnTo>
-                  <a:lnTo>
-                    <a:pt x="4981575" y="199874"/>
-                  </a:lnTo>
-                  <a:lnTo>
-                    <a:pt x="4981575" y="3245581"/>
-                  </a:lnTo>
-                  <a:close/>
-                </a:path>
-              </a:pathLst>
-            </a:custGeom>
-            <a:solidFill>
-              <a:schemeClr val="dk1"/>
-            </a:solidFill>
-            <a:ln>
-              <a:noFill/>
-            </a:ln>
-          </p:spPr>
-          <p:txBody>
-            <a:bodyPr anchorCtr="0" anchor="ctr" bIns="45700" lIns="91425" spcFirstLastPara="1" rIns="91425" wrap="square" tIns="45700">
-              <a:noAutofit/>
-            </a:bodyPr>
-            <a:lstStyle/>
-            <a:p>
-              <a:pPr indent="0" lvl="0" marL="0" marR="0" rtl="0" algn="l">
-                <a:spcBef>
-                  <a:spcPts val="0"/>
-                </a:spcBef>
-                <a:spcAft>
-                  <a:spcPts val="0"/>
-                </a:spcAft>
-                <a:buNone/>
-              </a:pPr>
-              <a:r>
-                <a:t/>
-              </a:r>
-              <a:endParaRPr sz="1800">
-                <a:solidFill>
-                  <a:srgbClr val="000000"/>
-                </a:solidFill>
-                <a:latin typeface="Calibri"/>
-                <a:ea typeface="Calibri"/>
-                <a:cs typeface="Calibri"/>
-                <a:sym typeface="Calibri"/>
-              </a:endParaRPr>
-            </a:p>
-          </p:txBody>
-        </p:sp>
-        <p:sp>
-          <p:nvSpPr>
-            <p:cNvPr id="223" name="Google Shape;223;p26"/>
-            <p:cNvSpPr/>
-            <p:nvPr/>
-          </p:nvSpPr>
-          <p:spPr>
-            <a:xfrm>
-              <a:off x="1177450" y="3763229"/>
-              <a:ext cx="6173152" cy="95178"/>
-            </a:xfrm>
-            <a:custGeom>
-              <a:rect b="b" l="l" r="r" t="t"/>
-              <a:pathLst>
-                <a:path extrusionOk="0" h="95178" w="6173152">
-                  <a:moveTo>
-                    <a:pt x="0" y="0"/>
-                  </a:moveTo>
-                  <a:cubicBezTo>
-                    <a:pt x="0" y="0"/>
-                    <a:pt x="129540" y="95178"/>
-                    <a:pt x="450533" y="95178"/>
-                  </a:cubicBezTo>
-                  <a:lnTo>
-                    <a:pt x="5817870" y="95178"/>
-                  </a:lnTo>
-                  <a:cubicBezTo>
-                    <a:pt x="5948363" y="95178"/>
-                    <a:pt x="6173153" y="0"/>
-                    <a:pt x="6173153" y="0"/>
-                  </a:cubicBezTo>
-                  <a:lnTo>
-                    <a:pt x="0" y="0"/>
-                  </a:lnTo>
-                  <a:close/>
-                </a:path>
-              </a:pathLst>
-            </a:custGeom>
-            <a:solidFill>
-              <a:schemeClr val="dk1"/>
-            </a:solidFill>
-            <a:ln>
-              <a:noFill/>
-            </a:ln>
-          </p:spPr>
-          <p:txBody>
-            <a:bodyPr anchorCtr="0" anchor="ctr" bIns="45700" lIns="91425" spcFirstLastPara="1" rIns="91425" wrap="square" tIns="45700">
-              <a:noAutofit/>
-            </a:bodyPr>
-            <a:lstStyle/>
-            <a:p>
-              <a:pPr indent="0" lvl="0" marL="0" marR="0" rtl="0" algn="l">
-                <a:spcBef>
-                  <a:spcPts val="0"/>
-                </a:spcBef>
-                <a:spcAft>
-                  <a:spcPts val="0"/>
-                </a:spcAft>
-                <a:buNone/>
-              </a:pPr>
-              <a:r>
-                <a:t/>
-              </a:r>
-              <a:endParaRPr sz="1800">
-                <a:solidFill>
-                  <a:srgbClr val="000000"/>
-                </a:solidFill>
-                <a:latin typeface="Calibri"/>
-                <a:ea typeface="Calibri"/>
-                <a:cs typeface="Calibri"/>
-                <a:sym typeface="Calibri"/>
-              </a:endParaRPr>
-            </a:p>
-          </p:txBody>
-        </p:sp>
-        <p:sp>
-          <p:nvSpPr>
-            <p:cNvPr id="224" name="Google Shape;224;p26"/>
-            <p:cNvSpPr/>
-            <p:nvPr/>
-          </p:nvSpPr>
-          <p:spPr>
-            <a:xfrm>
-              <a:off x="1177450" y="3687086"/>
-              <a:ext cx="6172200" cy="76142"/>
-            </a:xfrm>
-            <a:custGeom>
-              <a:rect b="b" l="l" r="r" t="t"/>
-              <a:pathLst>
-                <a:path extrusionOk="0" h="76142" w="6172200">
-                  <a:moveTo>
-                    <a:pt x="0" y="76143"/>
-                  </a:moveTo>
-                  <a:lnTo>
-                    <a:pt x="6172200" y="76143"/>
-                  </a:lnTo>
-                  <a:lnTo>
-                    <a:pt x="6172200" y="0"/>
-                  </a:lnTo>
-                  <a:lnTo>
-                    <a:pt x="0" y="0"/>
-                  </a:lnTo>
-                  <a:close/>
-                </a:path>
-              </a:pathLst>
-            </a:custGeom>
-            <a:solidFill>
-              <a:schemeClr val="dk2"/>
-            </a:solidFill>
-            <a:ln>
-              <a:noFill/>
-            </a:ln>
-          </p:spPr>
-          <p:txBody>
-            <a:bodyPr anchorCtr="0" anchor="ctr" bIns="45700" lIns="91425" spcFirstLastPara="1" rIns="91425" wrap="square" tIns="45700">
-              <a:noAutofit/>
-            </a:bodyPr>
-            <a:lstStyle/>
-            <a:p>
-              <a:pPr indent="0" lvl="0" marL="0" marR="0" rtl="0" algn="l">
-                <a:spcBef>
-                  <a:spcPts val="0"/>
-                </a:spcBef>
-                <a:spcAft>
-                  <a:spcPts val="0"/>
-                </a:spcAft>
-                <a:buNone/>
-              </a:pPr>
-              <a:r>
-                <a:t/>
-              </a:r>
-              <a:endParaRPr sz="1800">
-                <a:solidFill>
-                  <a:srgbClr val="000000"/>
-                </a:solidFill>
-                <a:latin typeface="Calibri"/>
-                <a:ea typeface="Calibri"/>
-                <a:cs typeface="Calibri"/>
-                <a:sym typeface="Calibri"/>
-              </a:endParaRPr>
-            </a:p>
-          </p:txBody>
-        </p:sp>
-        <p:sp>
-          <p:nvSpPr>
-            <p:cNvPr id="225" name="Google Shape;225;p26"/>
-            <p:cNvSpPr/>
-            <p:nvPr/>
-          </p:nvSpPr>
-          <p:spPr>
-            <a:xfrm>
-              <a:off x="3806350" y="3687086"/>
-              <a:ext cx="903922" cy="47589"/>
-            </a:xfrm>
-            <a:custGeom>
-              <a:rect b="b" l="l" r="r" t="t"/>
-              <a:pathLst>
-                <a:path extrusionOk="0" h="47589" w="903922">
-                  <a:moveTo>
-                    <a:pt x="0" y="0"/>
-                  </a:moveTo>
-                  <a:cubicBezTo>
-                    <a:pt x="0" y="0"/>
-                    <a:pt x="26670" y="47589"/>
-                    <a:pt x="53340" y="47589"/>
-                  </a:cubicBezTo>
-                  <a:lnTo>
-                    <a:pt x="850582" y="47589"/>
-                  </a:lnTo>
-                  <a:cubicBezTo>
-                    <a:pt x="877253" y="47589"/>
-                    <a:pt x="903922" y="0"/>
-                    <a:pt x="903922" y="0"/>
-                  </a:cubicBezTo>
-                  <a:lnTo>
-                    <a:pt x="0" y="0"/>
-                  </a:lnTo>
-                  <a:close/>
-                </a:path>
-              </a:pathLst>
-            </a:custGeom>
-            <a:solidFill>
-              <a:srgbClr val="142236">
-                <a:alpha val="53070"/>
-              </a:srgbClr>
-            </a:solidFill>
-            <a:ln>
-              <a:noFill/>
-            </a:ln>
-          </p:spPr>
-          <p:txBody>
-            <a:bodyPr anchorCtr="0" anchor="ctr" bIns="45700" lIns="91425" spcFirstLastPara="1" rIns="91425" wrap="square" tIns="45700">
-              <a:noAutofit/>
-            </a:bodyPr>
-            <a:lstStyle/>
-            <a:p>
-              <a:pPr indent="0" lvl="0" marL="0" marR="0" rtl="0" algn="l">
-                <a:spcBef>
-                  <a:spcPts val="0"/>
-                </a:spcBef>
-                <a:spcAft>
-                  <a:spcPts val="0"/>
-                </a:spcAft>
-                <a:buNone/>
-              </a:pPr>
-              <a:r>
-                <a:t/>
-              </a:r>
-              <a:endParaRPr sz="1800">
-                <a:solidFill>
-                  <a:srgbClr val="000000"/>
-                </a:solidFill>
-                <a:latin typeface="Calibri"/>
-                <a:ea typeface="Calibri"/>
-                <a:cs typeface="Calibri"/>
-                <a:sym typeface="Calibri"/>
-              </a:endParaRPr>
-            </a:p>
-          </p:txBody>
-        </p:sp>
-      </p:grpSp>
-      <p:sp>
-        <p:nvSpPr>
-          <p:cNvPr id="226" name="Google Shape;226;p26"/>
-          <p:cNvSpPr txBox="1"/>
-          <p:nvPr>
-            <p:ph idx="1" type="body"/>
-          </p:nvPr>
-        </p:nvSpPr>
-        <p:spPr>
-          <a:xfrm>
-            <a:off x="913175" y="1593750"/>
-            <a:ext cx="2681100" cy="978000"/>
-          </a:xfrm>
-          <a:prstGeom prst="rect">
-            <a:avLst/>
-          </a:prstGeom>
-        </p:spPr>
-        <p:txBody>
-          <a:bodyPr anchorCtr="0" anchor="t" bIns="0" lIns="0" spcFirstLastPara="1" rIns="0" wrap="square" tIns="0">
-            <a:noAutofit/>
-          </a:bodyPr>
-          <a:lstStyle/>
-          <a:p>
-            <a:pPr indent="0" lvl="0" marL="0" rtl="0" algn="l">
-              <a:spcBef>
-                <a:spcPts val="600"/>
-              </a:spcBef>
-              <a:spcAft>
-                <a:spcPts val="0"/>
-              </a:spcAft>
-              <a:buNone/>
-            </a:pPr>
-            <a:r>
-              <a:rPr lang="en">
-                <a:solidFill>
-                  <a:schemeClr val="dk1"/>
-                </a:solidFill>
-              </a:rPr>
-              <a:t>Showing our working app</a:t>
-            </a:r>
-            <a:endParaRPr>
-              <a:solidFill>
-                <a:schemeClr val="dk1"/>
-              </a:solidFill>
-            </a:endParaRPr>
-          </a:p>
-        </p:txBody>
-      </p:sp>
-      <p:sp>
-        <p:nvSpPr>
-          <p:cNvPr id="227" name="Google Shape;227;p26"/>
-          <p:cNvSpPr txBox="1"/>
-          <p:nvPr>
-            <p:ph type="title"/>
-          </p:nvPr>
-        </p:nvSpPr>
-        <p:spPr>
-          <a:xfrm>
-            <a:off x="913175" y="834175"/>
-            <a:ext cx="2681100" cy="627000"/>
-          </a:xfrm>
-          <a:prstGeom prst="rect">
-            <a:avLst/>
-          </a:prstGeom>
-        </p:spPr>
-        <p:txBody>
-          <a:bodyPr anchorCtr="0" anchor="b" bIns="0" lIns="0" spcFirstLastPara="1" rIns="0" wrap="square" tIns="0">
-            <a:noAutofit/>
-          </a:bodyPr>
-          <a:lstStyle/>
-          <a:p>
-            <a:pPr indent="0" lvl="0" marL="0" rtl="0" algn="l">
-              <a:spcBef>
-                <a:spcPts val="0"/>
-              </a:spcBef>
-              <a:spcAft>
-                <a:spcPts val="0"/>
-              </a:spcAft>
-              <a:buNone/>
-            </a:pPr>
-            <a:r>
-              <a:rPr lang="en">
-                <a:solidFill>
-                  <a:schemeClr val="accent1"/>
-                </a:solidFill>
-              </a:rPr>
-              <a:t>Desktop</a:t>
-            </a:r>
-            <a:r>
-              <a:rPr lang="en"/>
-              <a:t> app</a:t>
-            </a:r>
-            <a:endParaRPr/>
-          </a:p>
-        </p:txBody>
-      </p:sp>
-    </p:spTree>
-  </p:cSld>
-  <p:clrMapOvr>
-    <a:masterClrMapping/>
-  </p:clrMapOvr>
-</p:sld>
-</file>
-
 <file path=ppt/slides/slide2.xml><?xml version="1.0" encoding="utf-8"?>
 <p:sld xmlns:a="http://schemas.openxmlformats.org/drawingml/2006/main" xmlns:r="http://schemas.openxmlformats.org/officeDocument/2006/relationships" xmlns:mc="http://schemas.openxmlformats.org/markup-compatibility/2006" xmlns:mv="urn:schemas-microsoft-com:mac:vml" xmlns:p="http://schemas.openxmlformats.org/presentationml/2006/main" xmlns:c="http://schemas.openxmlformats.org/drawingml/2006/chart" xmlns:dgm="http://schemas.openxmlformats.org/drawingml/2006/diagram" xmlns:o="urn:schemas-microsoft-com:office:office" xmlns:v="urn:schemas-microsoft-com:vml" xmlns:pvml="urn:schemas-microsoft-com:office:powerpoint" xmlns:com="http://schemas.openxmlformats.org/drawingml/2006/compatibility" xmlns:p14="http://schemas.microsoft.com/office/powerpoint/2010/main" xmlns:p15="http://schemas.microsoft.com/office/powerpoint/2012/main">
   <p:cSld>
@@ -16987,7 +15418,7 @@
                   <a:schemeClr val="accent1"/>
                 </a:solidFill>
               </a:rPr>
-              <a:t>Web Pages</a:t>
+              <a:t>Live Demo</a:t>
             </a:r>
             <a:endParaRPr sz="1800"/>
           </a:p>
@@ -17097,19 +15528,19 @@
         <p:spPr>
           <a:xfrm>
             <a:off x="2679375" y="1160250"/>
-            <a:ext cx="3683400" cy="1801500"/>
+            <a:ext cx="3683400" cy="2179500"/>
           </a:xfrm>
           <a:prstGeom prst="rect">
             <a:avLst/>
           </a:prstGeom>
         </p:spPr>
         <p:txBody>
-          <a:bodyPr anchorCtr="0" anchor="b" bIns="0" lIns="0" spcFirstLastPara="1" rIns="0" wrap="square" tIns="0">
+          <a:bodyPr anchorCtr="0" anchor="ctr" bIns="0" lIns="0" spcFirstLastPara="1" rIns="0" wrap="square" tIns="0">
             <a:noAutofit/>
           </a:bodyPr>
           <a:lstStyle/>
           <a:p>
-            <a:pPr indent="0" lvl="0" marL="0" rtl="0" algn="l">
+            <a:pPr indent="0" lvl="0" marL="0" rtl="0" algn="ctr">
               <a:lnSpc>
                 <a:spcPct val="80000"/>
               </a:lnSpc>
@@ -17122,14 +15553,68 @@
               <a:buNone/>
             </a:pPr>
             <a:r>
-              <a:rPr lang="en" sz="4800">
+              <a:rPr lang="en" sz="3000">
                 <a:solidFill>
                   <a:schemeClr val="accent1"/>
                 </a:solidFill>
               </a:rPr>
               <a:t>Home Page</a:t>
             </a:r>
-            <a:endParaRPr sz="4800">
+            <a:endParaRPr sz="3000">
+              <a:solidFill>
+                <a:schemeClr val="accent1"/>
+              </a:solidFill>
+            </a:endParaRPr>
+          </a:p>
+          <a:p>
+            <a:pPr indent="0" lvl="0" marL="0" rtl="0" algn="ctr">
+              <a:lnSpc>
+                <a:spcPct val="80000"/>
+              </a:lnSpc>
+              <a:spcBef>
+                <a:spcPts val="0"/>
+              </a:spcBef>
+              <a:spcAft>
+                <a:spcPts val="0"/>
+              </a:spcAft>
+              <a:buNone/>
+            </a:pPr>
+            <a:r>
+              <a:rPr lang="en" sz="3000">
+                <a:solidFill>
+                  <a:schemeClr val="accent1"/>
+                </a:solidFill>
+              </a:rPr>
+              <a:t>Visuals Page</a:t>
+            </a:r>
+            <a:endParaRPr sz="3000">
+              <a:solidFill>
+                <a:schemeClr val="accent1"/>
+              </a:solidFill>
+            </a:endParaRPr>
+          </a:p>
+          <a:p>
+            <a:pPr indent="0" lvl="0" marL="0" rtl="0" algn="ctr">
+              <a:lnSpc>
+                <a:spcPct val="80000"/>
+              </a:lnSpc>
+              <a:spcBef>
+                <a:spcPts val="0"/>
+              </a:spcBef>
+              <a:spcAft>
+                <a:spcPts val="0"/>
+              </a:spcAft>
+              <a:buNone/>
+            </a:pPr>
+            <a:r>
+              <a:rPr lang="en" sz="3000">
+                <a:solidFill>
+                  <a:schemeClr val="accent1"/>
+                </a:solidFill>
+              </a:rPr>
+              <a:t>Predictions Page</a:t>
+            </a:r>
+            <a:endParaRPr sz="3000">
               <a:solidFill>
                 <a:schemeClr val="accent1"/>
               </a:solidFill>
@@ -17168,6 +15653,285 @@
 </file>
 
 <file path=ppt/theme/theme1.xml><?xml version="1.0" encoding="utf-8"?>
+<a:theme xmlns:a="http://schemas.openxmlformats.org/drawingml/2006/main" xmlns:r="http://schemas.openxmlformats.org/officeDocument/2006/relationships" name="Rutland template">
+  <a:themeElements>
+    <a:clrScheme name="Custom 347">
+      <a:dk1>
+        <a:srgbClr val="142236"/>
+      </a:dk1>
+      <a:lt1>
+        <a:srgbClr val="FFFFFF"/>
+      </a:lt1>
+      <a:dk2>
+        <a:srgbClr val="667180"/>
+      </a:dk2>
+      <a:lt2>
+        <a:srgbClr val="E5E8EB"/>
+      </a:lt2>
+      <a:accent1>
+        <a:srgbClr val="FF6035"/>
+      </a:accent1>
+      <a:accent2>
+        <a:srgbClr val="BB1C0B"/>
+      </a:accent2>
+      <a:accent3>
+        <a:srgbClr val="1DC8E6"/>
+      </a:accent3>
+      <a:accent4>
+        <a:srgbClr val="0D7FA3"/>
+      </a:accent4>
+      <a:accent5>
+        <a:srgbClr val="8FC55D"/>
+      </a:accent5>
+      <a:accent6>
+        <a:srgbClr val="4E9934"/>
+      </a:accent6>
+      <a:hlink>
+        <a:srgbClr val="FFFFFF"/>
+      </a:hlink>
+      <a:folHlink>
+        <a:srgbClr val="6611CC"/>
+      </a:folHlink>
+    </a:clrScheme>
+    <a:fontScheme name="Office">
+      <a:majorFont>
+        <a:latin typeface="Arial"/>
+        <a:ea typeface=""/>
+        <a:cs typeface=""/>
+        <a:font script="Jpan" typeface="ＭＳ Ｐゴシック"/>
+        <a:font script="Hang" typeface="맑은 고딕"/>
+        <a:font script="Hans" typeface="宋体"/>
+        <a:font script="Hant" typeface="新細明體"/>
+        <a:font script="Arab" typeface="Times New Roman"/>
+        <a:font script="Hebr" typeface="Times New Roman"/>
+        <a:font script="Thai" typeface="Angsana New"/>
+        <a:font script="Ethi" typeface="Nyala"/>
+        <a:font script="Beng" typeface="Vrinda"/>
+        <a:font script="Gujr" typeface="Shruti"/>
+        <a:font script="Khmr" typeface="MoolBoran"/>
+        <a:font script="Knda" typeface="Tunga"/>
+        <a:font script="Guru" typeface="Raavi"/>
+        <a:font script="Cans" typeface="Euphemia"/>
+        <a:font script="Cher" typeface="Plantagenet Cherokee"/>
+        <a:font script="Yiii" typeface="Microsoft Yi Baiti"/>
+        <a:font script="Tibt" typeface="Microsoft Himalaya"/>
+        <a:font script="Thaa" typeface="MV Boli"/>
+        <a:font script="Deva" typeface="Mangal"/>
+        <a:font script="Telu" typeface="Gautami"/>
+        <a:font script="Taml" typeface="Latha"/>
+        <a:font script="Syrc" typeface="Estrangelo Edessa"/>
+        <a:font script="Orya" typeface="Kalinga"/>
+        <a:font script="Mlym" typeface="Kartika"/>
+        <a:font script="Laoo" typeface="DokChampa"/>
+        <a:font script="Sinh" typeface="Iskoola Pota"/>
+        <a:font script="Mong" typeface="Mongolian Baiti"/>
+        <a:font script="Viet" typeface="Times New Roman"/>
+        <a:font script="Uigh" typeface="Microsoft Uighur"/>
+        <a:font script="Geor" typeface="Sylfaen"/>
+      </a:majorFont>
+      <a:minorFont>
+        <a:latin typeface="Arial"/>
+        <a:ea typeface=""/>
+        <a:cs typeface=""/>
+        <a:font script="Jpan" typeface="ＭＳ Ｐゴシック"/>
+        <a:font script="Hang" typeface="맑은 고딕"/>
+        <a:font script="Hans" typeface="宋体"/>
+        <a:font script="Hant" typeface="新細明體"/>
+        <a:font script="Arab" typeface="Arial"/>
+        <a:font script="Hebr" typeface="Arial"/>
+        <a:font script="Thai" typeface="Cordia New"/>
+        <a:font script="Ethi" typeface="Nyala"/>
+        <a:font script="Beng" typeface="Vrinda"/>
+        <a:font script="Gujr" typeface="Shruti"/>
+        <a:font script="Khmr" typeface="DaunPenh"/>
+        <a:font script="Knda" typeface="Tunga"/>
+        <a:font script="Guru" typeface="Raavi"/>
+        <a:font script="Cans" typeface="Euphemia"/>
+        <a:font script="Cher" typeface="Plantagenet Cherokee"/>
+        <a:font script="Yiii" typeface="Microsoft Yi Baiti"/>
+        <a:font script="Tibt" typeface="Microsoft Himalaya"/>
+        <a:font script="Thaa" typeface="MV Boli"/>
+        <a:font script="Deva" typeface="Mangal"/>
+        <a:font script="Telu" typeface="Gautami"/>
+        <a:font script="Taml" typeface="Latha"/>
+        <a:font script="Syrc" typeface="Estrangelo Edessa"/>
+        <a:font script="Orya" typeface="Kalinga"/>
+        <a:font script="Mlym" typeface="Kartika"/>
+        <a:font script="Laoo" typeface="DokChampa"/>
+        <a:font script="Sinh" typeface="Iskoola Pota"/>
+        <a:font script="Mong" typeface="Mongolian Baiti"/>
+        <a:font script="Viet" typeface="Arial"/>
+        <a:font script="Uigh" typeface="Microsoft Uighur"/>
+        <a:font script="Geor" typeface="Sylfaen"/>
+      </a:minorFont>
+    </a:fontScheme>
+    <a:fmtScheme name="Office">
+      <a:fillStyleLst>
+        <a:solidFill>
+          <a:schemeClr val="phClr"/>
+        </a:solidFill>
+        <a:gradFill rotWithShape="1">
+          <a:gsLst>
+            <a:gs pos="0">
+              <a:schemeClr val="phClr">
+                <a:tint val="50000"/>
+                <a:satMod val="300000"/>
+              </a:schemeClr>
+            </a:gs>
+            <a:gs pos="35000">
+              <a:schemeClr val="phClr">
+                <a:tint val="37000"/>
+                <a:satMod val="300000"/>
+              </a:schemeClr>
+            </a:gs>
+            <a:gs pos="100000">
+              <a:schemeClr val="phClr">
+                <a:tint val="15000"/>
+                <a:satMod val="350000"/>
+              </a:schemeClr>
+            </a:gs>
+          </a:gsLst>
+          <a:lin ang="16200000" scaled="1"/>
+        </a:gradFill>
+        <a:gradFill rotWithShape="1">
+          <a:gsLst>
+            <a:gs pos="0">
+              <a:schemeClr val="phClr">
+                <a:tint val="100000"/>
+                <a:shade val="100000"/>
+                <a:satMod val="130000"/>
+              </a:schemeClr>
+            </a:gs>
+            <a:gs pos="100000">
+              <a:schemeClr val="phClr">
+                <a:tint val="50000"/>
+                <a:shade val="100000"/>
+                <a:satMod val="350000"/>
+              </a:schemeClr>
+            </a:gs>
+          </a:gsLst>
+          <a:lin ang="16200000" scaled="0"/>
+        </a:gradFill>
+      </a:fillStyleLst>
+      <a:lnStyleLst>
+        <a:ln w="9525" cap="flat" cmpd="sng" algn="ctr">
+          <a:solidFill>
+            <a:schemeClr val="phClr">
+              <a:shade val="95000"/>
+              <a:satMod val="105000"/>
+            </a:schemeClr>
+          </a:solidFill>
+          <a:prstDash val="solid"/>
+        </a:ln>
+        <a:ln w="25400" cap="flat" cmpd="sng" algn="ctr">
+          <a:solidFill>
+            <a:schemeClr val="phClr"/>
+          </a:solidFill>
+          <a:prstDash val="solid"/>
+        </a:ln>
+        <a:ln w="38100" cap="flat" cmpd="sng" algn="ctr">
+          <a:solidFill>
+            <a:schemeClr val="phClr"/>
+          </a:solidFill>
+          <a:prstDash val="solid"/>
+        </a:ln>
+      </a:lnStyleLst>
+      <a:effectStyleLst>
+        <a:effectStyle>
+          <a:effectLst>
+            <a:outerShdw blurRad="40000" dist="20000" dir="5400000" rotWithShape="0">
+              <a:srgbClr val="000000">
+                <a:alpha val="38000"/>
+              </a:srgbClr>
+            </a:outerShdw>
+          </a:effectLst>
+        </a:effectStyle>
+        <a:effectStyle>
+          <a:effectLst>
+            <a:outerShdw blurRad="40000" dist="23000" dir="5400000" rotWithShape="0">
+              <a:srgbClr val="000000">
+                <a:alpha val="35000"/>
+              </a:srgbClr>
+            </a:outerShdw>
+          </a:effectLst>
+        </a:effectStyle>
+        <a:effectStyle>
+          <a:effectLst>
+            <a:outerShdw blurRad="40000" dist="23000" dir="5400000" rotWithShape="0">
+              <a:srgbClr val="000000">
+                <a:alpha val="35000"/>
+              </a:srgbClr>
+            </a:outerShdw>
+          </a:effectLst>
+          <a:scene3d>
+            <a:camera prst="orthographicFront">
+              <a:rot lat="0" lon="0" rev="0"/>
+            </a:camera>
+            <a:lightRig rig="threePt" dir="t">
+              <a:rot lat="0" lon="0" rev="1200000"/>
+            </a:lightRig>
+          </a:scene3d>
+          <a:sp3d>
+            <a:bevelT w="63500" h="25400"/>
+          </a:sp3d>
+        </a:effectStyle>
+      </a:effectStyleLst>
+      <a:bgFillStyleLst>
+        <a:solidFill>
+          <a:schemeClr val="phClr"/>
+        </a:solidFill>
+        <a:gradFill rotWithShape="1">
+          <a:gsLst>
+            <a:gs pos="0">
+              <a:schemeClr val="phClr">
+                <a:tint val="40000"/>
+                <a:satMod val="350000"/>
+              </a:schemeClr>
+            </a:gs>
+            <a:gs pos="40000">
+              <a:schemeClr val="phClr">
+                <a:tint val="45000"/>
+                <a:shade val="99000"/>
+                <a:satMod val="350000"/>
+              </a:schemeClr>
+            </a:gs>
+            <a:gs pos="100000">
+              <a:schemeClr val="phClr">
+                <a:shade val="20000"/>
+                <a:satMod val="255000"/>
+              </a:schemeClr>
+            </a:gs>
+          </a:gsLst>
+          <a:path path="circle">
+            <a:fillToRect l="50000" t="-80000" r="50000" b="180000"/>
+          </a:path>
+        </a:gradFill>
+        <a:gradFill rotWithShape="1">
+          <a:gsLst>
+            <a:gs pos="0">
+              <a:schemeClr val="phClr">
+                <a:tint val="80000"/>
+                <a:satMod val="300000"/>
+              </a:schemeClr>
+            </a:gs>
+            <a:gs pos="100000">
+              <a:schemeClr val="phClr">
+                <a:shade val="30000"/>
+                <a:satMod val="200000"/>
+              </a:schemeClr>
+            </a:gs>
+          </a:gsLst>
+          <a:path path="circle">
+            <a:fillToRect l="50000" t="50000" r="50000" b="50000"/>
+          </a:path>
+        </a:gradFill>
+      </a:bgFillStyleLst>
+    </a:fmtScheme>
+  </a:themeElements>
+</a:theme>
+</file>
+
+<file path=ppt/theme/theme2.xml><?xml version="1.0" encoding="utf-8"?>
 <a:theme xmlns:a="http://schemas.openxmlformats.org/drawingml/2006/main" xmlns:r="http://schemas.openxmlformats.org/officeDocument/2006/relationships">
   <a:themeElements>
     <a:clrScheme name="Default">
@@ -17444,283 +16208,4 @@
     </a:fmtScheme>
   </a:themeElements>
 </a:theme>
-</file>
-
-<file path=ppt/theme/theme2.xml><?xml version="1.0" encoding="utf-8"?>
-<a:theme xmlns:a="http://schemas.openxmlformats.org/drawingml/2006/main" xmlns:r="http://schemas.openxmlformats.org/officeDocument/2006/relationships" name="Rutland template">
-  <a:themeElements>
-    <a:clrScheme name="Custom 347">
-      <a:dk1>
-        <a:srgbClr val="142236"/>
-      </a:dk1>
-      <a:lt1>
-        <a:srgbClr val="FFFFFF"/>
-      </a:lt1>
-      <a:dk2>
-        <a:srgbClr val="667180"/>
-      </a:dk2>
-      <a:lt2>
-        <a:srgbClr val="E5E8EB"/>
-      </a:lt2>
-      <a:accent1>
-        <a:srgbClr val="FF6035"/>
-      </a:accent1>
-      <a:accent2>
-        <a:srgbClr val="BB1C0B"/>
-      </a:accent2>
-      <a:accent3>
-        <a:srgbClr val="1DC8E6"/>
-      </a:accent3>
-      <a:accent4>
-        <a:srgbClr val="0D7FA3"/>
-      </a:accent4>
-      <a:accent5>
-        <a:srgbClr val="8FC55D"/>
-      </a:accent5>
-      <a:accent6>
-        <a:srgbClr val="4E9934"/>
-      </a:accent6>
-      <a:hlink>
-        <a:srgbClr val="FFFFFF"/>
-      </a:hlink>
-      <a:folHlink>
-        <a:srgbClr val="6611CC"/>
-      </a:folHlink>
-    </a:clrScheme>
-    <a:fontScheme name="Office">
-      <a:majorFont>
-        <a:latin typeface="Arial"/>
-        <a:ea typeface=""/>
-        <a:cs typeface=""/>
-        <a:font script="Jpan" typeface="ＭＳ Ｐゴシック"/>
-        <a:font script="Hang" typeface="맑은 고딕"/>
-        <a:font script="Hans" typeface="宋体"/>
-        <a:font script="Hant" typeface="新細明體"/>
-        <a:font script="Arab" typeface="Times New Roman"/>
-        <a:font script="Hebr" typeface="Times New Roman"/>
-        <a:font script="Thai" typeface="Angsana New"/>
-        <a:font script="Ethi" typeface="Nyala"/>
-        <a:font script="Beng" typeface="Vrinda"/>
-        <a:font script="Gujr" typeface="Shruti"/>
-        <a:font script="Khmr" typeface="MoolBoran"/>
-        <a:font script="Knda" typeface="Tunga"/>
-        <a:font script="Guru" typeface="Raavi"/>
-        <a:font script="Cans" typeface="Euphemia"/>
-        <a:font script="Cher" typeface="Plantagenet Cherokee"/>
-        <a:font script="Yiii" typeface="Microsoft Yi Baiti"/>
-        <a:font script="Tibt" typeface="Microsoft Himalaya"/>
-        <a:font script="Thaa" typeface="MV Boli"/>
-        <a:font script="Deva" typeface="Mangal"/>
-        <a:font script="Telu" typeface="Gautami"/>
-        <a:font script="Taml" typeface="Latha"/>
-        <a:font script="Syrc" typeface="Estrangelo Edessa"/>
-        <a:font script="Orya" typeface="Kalinga"/>
-        <a:font script="Mlym" typeface="Kartika"/>
-        <a:font script="Laoo" typeface="DokChampa"/>
-        <a:font script="Sinh" typeface="Iskoola Pota"/>
-        <a:font script="Mong" typeface="Mongolian Baiti"/>
-        <a:font script="Viet" typeface="Times New Roman"/>
-        <a:font script="Uigh" typeface="Microsoft Uighur"/>
-        <a:font script="Geor" typeface="Sylfaen"/>
-      </a:majorFont>
-      <a:minorFont>
-        <a:latin typeface="Arial"/>
-        <a:ea typeface=""/>
-        <a:cs typeface=""/>
-        <a:font script="Jpan" typeface="ＭＳ Ｐゴシック"/>
-        <a:font script="Hang" typeface="맑은 고딕"/>
-        <a:font script="Hans" typeface="宋体"/>
-        <a:font script="Hant" typeface="新細明體"/>
-        <a:font script="Arab" typeface="Arial"/>
-        <a:font script="Hebr" typeface="Arial"/>
-        <a:font script="Thai" typeface="Cordia New"/>
-        <a:font script="Ethi" typeface="Nyala"/>
-        <a:font script="Beng" typeface="Vrinda"/>
-        <a:font script="Gujr" typeface="Shruti"/>
-        <a:font script="Khmr" typeface="DaunPenh"/>
-        <a:font script="Knda" typeface="Tunga"/>
-        <a:font script="Guru" typeface="Raavi"/>
-        <a:font script="Cans" typeface="Euphemia"/>
-        <a:font script="Cher" typeface="Plantagenet Cherokee"/>
-        <a:font script="Yiii" typeface="Microsoft Yi Baiti"/>
-        <a:font script="Tibt" typeface="Microsoft Himalaya"/>
-        <a:font script="Thaa" typeface="MV Boli"/>
-        <a:font script="Deva" typeface="Mangal"/>
-        <a:font script="Telu" typeface="Gautami"/>
-        <a:font script="Taml" typeface="Latha"/>
-        <a:font script="Syrc" typeface="Estrangelo Edessa"/>
-        <a:font script="Orya" typeface="Kalinga"/>
-        <a:font script="Mlym" typeface="Kartika"/>
-        <a:font script="Laoo" typeface="DokChampa"/>
-        <a:font script="Sinh" typeface="Iskoola Pota"/>
-        <a:font script="Mong" typeface="Mongolian Baiti"/>
-        <a:font script="Viet" typeface="Arial"/>
-        <a:font script="Uigh" typeface="Microsoft Uighur"/>
-        <a:font script="Geor" typeface="Sylfaen"/>
-      </a:minorFont>
-    </a:fontScheme>
-    <a:fmtScheme name="Office">
-      <a:fillStyleLst>
-        <a:solidFill>
-          <a:schemeClr val="phClr"/>
-        </a:solidFill>
-        <a:gradFill rotWithShape="1">
-          <a:gsLst>
-            <a:gs pos="0">
-              <a:schemeClr val="phClr">
-                <a:tint val="50000"/>
-                <a:satMod val="300000"/>
-              </a:schemeClr>
-            </a:gs>
-            <a:gs pos="35000">
-              <a:schemeClr val="phClr">
-                <a:tint val="37000"/>
-                <a:satMod val="300000"/>
-              </a:schemeClr>
-            </a:gs>
-            <a:gs pos="100000">
-              <a:schemeClr val="phClr">
-                <a:tint val="15000"/>
-                <a:satMod val="350000"/>
-              </a:schemeClr>
-            </a:gs>
-          </a:gsLst>
-          <a:lin ang="16200000" scaled="1"/>
-        </a:gradFill>
-        <a:gradFill rotWithShape="1">
-          <a:gsLst>
-            <a:gs pos="0">
-              <a:schemeClr val="phClr">
-                <a:tint val="100000"/>
-                <a:shade val="100000"/>
-                <a:satMod val="130000"/>
-              </a:schemeClr>
-            </a:gs>
-            <a:gs pos="100000">
-              <a:schemeClr val="phClr">
-                <a:tint val="50000"/>
-                <a:shade val="100000"/>
-                <a:satMod val="350000"/>
-              </a:schemeClr>
-            </a:gs>
-          </a:gsLst>
-          <a:lin ang="16200000" scaled="0"/>
-        </a:gradFill>
-      </a:fillStyleLst>
-      <a:lnStyleLst>
-        <a:ln w="9525" cap="flat" cmpd="sng" algn="ctr">
-          <a:solidFill>
-            <a:schemeClr val="phClr">
-              <a:shade val="95000"/>
-              <a:satMod val="105000"/>
-            </a:schemeClr>
-          </a:solidFill>
-          <a:prstDash val="solid"/>
-        </a:ln>
-        <a:ln w="25400" cap="flat" cmpd="sng" algn="ctr">
-          <a:solidFill>
-            <a:schemeClr val="phClr"/>
-          </a:solidFill>
-          <a:prstDash val="solid"/>
-        </a:ln>
-        <a:ln w="38100" cap="flat" cmpd="sng" algn="ctr">
-          <a:solidFill>
-            <a:schemeClr val="phClr"/>
-          </a:solidFill>
-          <a:prstDash val="solid"/>
-        </a:ln>
-      </a:lnStyleLst>
-      <a:effectStyleLst>
-        <a:effectStyle>
-          <a:effectLst>
-            <a:outerShdw blurRad="40000" dist="20000" dir="5400000" rotWithShape="0">
-              <a:srgbClr val="000000">
-                <a:alpha val="38000"/>
-              </a:srgbClr>
-            </a:outerShdw>
-          </a:effectLst>
-        </a:effectStyle>
-        <a:effectStyle>
-          <a:effectLst>
-            <a:outerShdw blurRad="40000" dist="23000" dir="5400000" rotWithShape="0">
-              <a:srgbClr val="000000">
-                <a:alpha val="35000"/>
-              </a:srgbClr>
-            </a:outerShdw>
-          </a:effectLst>
-        </a:effectStyle>
-        <a:effectStyle>
-          <a:effectLst>
-            <a:outerShdw blurRad="40000" dist="23000" dir="5400000" rotWithShape="0">
-              <a:srgbClr val="000000">
-                <a:alpha val="35000"/>
-              </a:srgbClr>
-            </a:outerShdw>
-          </a:effectLst>
-          <a:scene3d>
-            <a:camera prst="orthographicFront">
-              <a:rot lat="0" lon="0" rev="0"/>
-            </a:camera>
-            <a:lightRig rig="threePt" dir="t">
-              <a:rot lat="0" lon="0" rev="1200000"/>
-            </a:lightRig>
-          </a:scene3d>
-          <a:sp3d>
-            <a:bevelT w="63500" h="25400"/>
-          </a:sp3d>
-        </a:effectStyle>
-      </a:effectStyleLst>
-      <a:bgFillStyleLst>
-        <a:solidFill>
-          <a:schemeClr val="phClr"/>
-        </a:solidFill>
-        <a:gradFill rotWithShape="1">
-          <a:gsLst>
-            <a:gs pos="0">
-              <a:schemeClr val="phClr">
-                <a:tint val="40000"/>
-                <a:satMod val="350000"/>
-              </a:schemeClr>
-            </a:gs>
-            <a:gs pos="40000">
-              <a:schemeClr val="phClr">
-                <a:tint val="45000"/>
-                <a:shade val="99000"/>
-                <a:satMod val="350000"/>
-              </a:schemeClr>
-            </a:gs>
-            <a:gs pos="100000">
-              <a:schemeClr val="phClr">
-                <a:shade val="20000"/>
-                <a:satMod val="255000"/>
-              </a:schemeClr>
-            </a:gs>
-          </a:gsLst>
-          <a:path path="circle">
-            <a:fillToRect l="50000" t="-80000" r="50000" b="180000"/>
-          </a:path>
-        </a:gradFill>
-        <a:gradFill rotWithShape="1">
-          <a:gsLst>
-            <a:gs pos="0">
-              <a:schemeClr val="phClr">
-                <a:tint val="80000"/>
-                <a:satMod val="300000"/>
-              </a:schemeClr>
-            </a:gs>
-            <a:gs pos="100000">
-              <a:schemeClr val="phClr">
-                <a:shade val="30000"/>
-                <a:satMod val="200000"/>
-              </a:schemeClr>
-            </a:gs>
-          </a:gsLst>
-          <a:path path="circle">
-            <a:fillToRect l="50000" t="50000" r="50000" b="50000"/>
-          </a:path>
-        </a:gradFill>
-      </a:bgFillStyleLst>
-    </a:fmtScheme>
-  </a:themeElements>
-</a:theme>
 </file>
</xml_diff>